<commit_message>
Added figures and ppt changes.
Added figures, added dataset to alec-folder, and added descriptive statistics in PowerPoint slides.
</commit_message>
<xml_diff>
--- a/documents/presentation.pptx
+++ b/documents/presentation.pptx
@@ -279,7 +279,7 @@
           <a:p>
             <a:fld id="{1C5B6DA1-888F-3646-B1A1-509F9E9697D0}" type="datetimeFigureOut">
               <a:rPr lang="en-US" smtClean="0"/>
-              <a:t>11/21/19</a:t>
+              <a:t>11/23/19</a:t>
             </a:fld>
             <a:endParaRPr lang="en-US"/>
           </a:p>
@@ -477,7 +477,7 @@
           <a:p>
             <a:fld id="{1C5B6DA1-888F-3646-B1A1-509F9E9697D0}" type="datetimeFigureOut">
               <a:rPr lang="en-US" smtClean="0"/>
-              <a:t>11/21/19</a:t>
+              <a:t>11/23/19</a:t>
             </a:fld>
             <a:endParaRPr lang="en-US"/>
           </a:p>
@@ -685,7 +685,7 @@
           <a:p>
             <a:fld id="{1C5B6DA1-888F-3646-B1A1-509F9E9697D0}" type="datetimeFigureOut">
               <a:rPr lang="en-US" smtClean="0"/>
-              <a:t>11/21/19</a:t>
+              <a:t>11/23/19</a:t>
             </a:fld>
             <a:endParaRPr lang="en-US"/>
           </a:p>
@@ -883,7 +883,7 @@
           <a:p>
             <a:fld id="{1C5B6DA1-888F-3646-B1A1-509F9E9697D0}" type="datetimeFigureOut">
               <a:rPr lang="en-US" smtClean="0"/>
-              <a:t>11/21/19</a:t>
+              <a:t>11/23/19</a:t>
             </a:fld>
             <a:endParaRPr lang="en-US"/>
           </a:p>
@@ -1158,7 +1158,7 @@
           <a:p>
             <a:fld id="{1C5B6DA1-888F-3646-B1A1-509F9E9697D0}" type="datetimeFigureOut">
               <a:rPr lang="en-US" smtClean="0"/>
-              <a:t>11/21/19</a:t>
+              <a:t>11/23/19</a:t>
             </a:fld>
             <a:endParaRPr lang="en-US"/>
           </a:p>
@@ -1423,7 +1423,7 @@
           <a:p>
             <a:fld id="{1C5B6DA1-888F-3646-B1A1-509F9E9697D0}" type="datetimeFigureOut">
               <a:rPr lang="en-US" smtClean="0"/>
-              <a:t>11/21/19</a:t>
+              <a:t>11/23/19</a:t>
             </a:fld>
             <a:endParaRPr lang="en-US"/>
           </a:p>
@@ -1835,7 +1835,7 @@
           <a:p>
             <a:fld id="{1C5B6DA1-888F-3646-B1A1-509F9E9697D0}" type="datetimeFigureOut">
               <a:rPr lang="en-US" smtClean="0"/>
-              <a:t>11/21/19</a:t>
+              <a:t>11/23/19</a:t>
             </a:fld>
             <a:endParaRPr lang="en-US"/>
           </a:p>
@@ -1976,7 +1976,7 @@
           <a:p>
             <a:fld id="{1C5B6DA1-888F-3646-B1A1-509F9E9697D0}" type="datetimeFigureOut">
               <a:rPr lang="en-US" smtClean="0"/>
-              <a:t>11/21/19</a:t>
+              <a:t>11/23/19</a:t>
             </a:fld>
             <a:endParaRPr lang="en-US"/>
           </a:p>
@@ -2089,7 +2089,7 @@
           <a:p>
             <a:fld id="{1C5B6DA1-888F-3646-B1A1-509F9E9697D0}" type="datetimeFigureOut">
               <a:rPr lang="en-US" smtClean="0"/>
-              <a:t>11/21/19</a:t>
+              <a:t>11/23/19</a:t>
             </a:fld>
             <a:endParaRPr lang="en-US"/>
           </a:p>
@@ -2400,7 +2400,7 @@
           <a:p>
             <a:fld id="{1C5B6DA1-888F-3646-B1A1-509F9E9697D0}" type="datetimeFigureOut">
               <a:rPr lang="en-US" smtClean="0"/>
-              <a:t>11/21/19</a:t>
+              <a:t>11/23/19</a:t>
             </a:fld>
             <a:endParaRPr lang="en-US"/>
           </a:p>
@@ -2688,7 +2688,7 @@
           <a:p>
             <a:fld id="{1C5B6DA1-888F-3646-B1A1-509F9E9697D0}" type="datetimeFigureOut">
               <a:rPr lang="en-US" smtClean="0"/>
-              <a:t>11/21/19</a:t>
+              <a:t>11/23/19</a:t>
             </a:fld>
             <a:endParaRPr lang="en-US"/>
           </a:p>
@@ -2929,7 +2929,7 @@
           <a:p>
             <a:fld id="{1C5B6DA1-888F-3646-B1A1-509F9E9697D0}" type="datetimeFigureOut">
               <a:rPr lang="en-US" smtClean="0"/>
-              <a:t>11/21/19</a:t>
+              <a:t>11/23/19</a:t>
             </a:fld>
             <a:endParaRPr lang="en-US"/>
           </a:p>
@@ -4594,7 +4594,7 @@
           <p:nvPr>
             <p:extLst>
               <p:ext uri="{D42A27DB-BD31-4B8C-83A1-F6EECF244321}">
-                <p14:modId xmlns:p14="http://schemas.microsoft.com/office/powerpoint/2010/main" val="2974486863"/>
+                <p14:modId xmlns:p14="http://schemas.microsoft.com/office/powerpoint/2010/main" val="3138720293"/>
               </p:ext>
             </p:extLst>
           </p:nvPr>
@@ -4759,28 +4759,34 @@
                     <a:p>
                       <a:r>
                         <a:rPr lang="en-US" dirty="0"/>
-                        <a:t>2</a:t>
-                      </a:r>
-                    </a:p>
-                  </a:txBody>
-                  <a:tcPr/>
-                </a:tc>
-                <a:tc>
-                  <a:txBody>
-                    <a:bodyPr/>
-                    <a:lstStyle/>
-                    <a:p>
-                      <a:endParaRPr lang="en-US" dirty="0"/>
-                    </a:p>
-                  </a:txBody>
-                  <a:tcPr/>
-                </a:tc>
-                <a:tc>
-                  <a:txBody>
-                    <a:bodyPr/>
-                    <a:lstStyle/>
-                    <a:p>
-                      <a:endParaRPr lang="en-US" dirty="0"/>
+                        <a:t>54.37</a:t>
+                      </a:r>
+                    </a:p>
+                  </a:txBody>
+                  <a:tcPr/>
+                </a:tc>
+                <a:tc>
+                  <a:txBody>
+                    <a:bodyPr/>
+                    <a:lstStyle/>
+                    <a:p>
+                      <a:r>
+                        <a:rPr lang="en-US" dirty="0"/>
+                        <a:t>9.10</a:t>
+                      </a:r>
+                    </a:p>
+                  </a:txBody>
+                  <a:tcPr/>
+                </a:tc>
+                <a:tc>
+                  <a:txBody>
+                    <a:bodyPr/>
+                    <a:lstStyle/>
+                    <a:p>
+                      <a:r>
+                        <a:rPr lang="en-US" dirty="0"/>
+                        <a:t>29-77</a:t>
+                      </a:r>
                     </a:p>
                   </a:txBody>
                   <a:tcPr/>
@@ -4839,293 +4845,38 @@
                     <a:p>
                       <a:r>
                         <a:rPr lang="en-US" dirty="0"/>
-                        <a:t>4</a:t>
-                      </a:r>
-                    </a:p>
-                  </a:txBody>
-                  <a:tcPr/>
-                </a:tc>
-                <a:tc>
-                  <a:txBody>
-                    <a:bodyPr/>
-                    <a:lstStyle/>
-                    <a:p>
-                      <a:endParaRPr lang="en-US"/>
-                    </a:p>
-                  </a:txBody>
-                  <a:tcPr/>
-                </a:tc>
-                <a:tc>
-                  <a:txBody>
-                    <a:bodyPr/>
-                    <a:lstStyle/>
-                    <a:p>
-                      <a:endParaRPr lang="en-US"/>
-                    </a:p>
-                  </a:txBody>
-                  <a:tcPr/>
-                </a:tc>
-                <a:tc>
-                  <a:txBody>
-                    <a:bodyPr/>
-                    <a:lstStyle/>
-                    <a:p>
-                      <a:endParaRPr lang="en-US" dirty="0"/>
-                    </a:p>
-                  </a:txBody>
-                  <a:tcPr/>
-                </a:tc>
-                <a:tc>
-                  <a:txBody>
-                    <a:bodyPr/>
-                    <a:lstStyle/>
-                    <a:p>
-                      <a:r>
-                        <a:rPr lang="en-US" dirty="0"/>
-                        <a:t>Resting Blood Pressure</a:t>
-                      </a:r>
-                    </a:p>
-                  </a:txBody>
-                  <a:tcPr/>
-                </a:tc>
-                <a:extLst>
-                  <a:ext uri="{0D108BD9-81ED-4DB2-BD59-A6C34878D82A}">
-                    <a16:rowId xmlns:a16="http://schemas.microsoft.com/office/drawing/2014/main" val="1958690204"/>
-                  </a:ext>
-                </a:extLst>
-              </a:tr>
-              <a:tr h="602049">
-                <a:tc>
-                  <a:txBody>
-                    <a:bodyPr/>
-                    <a:lstStyle/>
-                    <a:p>
-                      <a:r>
-                        <a:rPr lang="en-US" dirty="0"/>
-                        <a:t>Chol</a:t>
-                      </a:r>
-                    </a:p>
-                  </a:txBody>
-                  <a:tcPr/>
-                </a:tc>
-                <a:tc>
-                  <a:txBody>
-                    <a:bodyPr/>
-                    <a:lstStyle/>
-                    <a:p>
-                      <a:r>
-                        <a:rPr lang="en-US" dirty="0"/>
-                        <a:t>2</a:t>
-                      </a:r>
-                    </a:p>
-                  </a:txBody>
-                  <a:tcPr/>
-                </a:tc>
-                <a:tc>
-                  <a:txBody>
-                    <a:bodyPr/>
-                    <a:lstStyle/>
-                    <a:p>
-                      <a:endParaRPr lang="en-US"/>
-                    </a:p>
-                  </a:txBody>
-                  <a:tcPr/>
-                </a:tc>
-                <a:tc>
-                  <a:txBody>
-                    <a:bodyPr/>
-                    <a:lstStyle/>
-                    <a:p>
-                      <a:endParaRPr lang="en-US" dirty="0"/>
-                    </a:p>
-                  </a:txBody>
-                  <a:tcPr/>
-                </a:tc>
-                <a:tc>
-                  <a:txBody>
-                    <a:bodyPr/>
-                    <a:lstStyle/>
-                    <a:p>
-                      <a:endParaRPr lang="en-US"/>
-                    </a:p>
-                  </a:txBody>
-                  <a:tcPr/>
-                </a:tc>
-                <a:tc>
-                  <a:txBody>
-                    <a:bodyPr/>
-                    <a:lstStyle/>
-                    <a:p>
-                      <a:r>
-                        <a:rPr lang="en-US" dirty="0" err="1"/>
-                        <a:t>Cholestrol</a:t>
-                      </a:r>
-                      <a:endParaRPr lang="en-US" dirty="0"/>
-                    </a:p>
-                  </a:txBody>
-                  <a:tcPr/>
-                </a:tc>
-                <a:extLst>
-                  <a:ext uri="{0D108BD9-81ED-4DB2-BD59-A6C34878D82A}">
-                    <a16:rowId xmlns:a16="http://schemas.microsoft.com/office/drawing/2014/main" val="3620477404"/>
-                  </a:ext>
-                </a:extLst>
-              </a:tr>
-              <a:tr h="586355">
-                <a:tc>
-                  <a:txBody>
-                    <a:bodyPr/>
-                    <a:lstStyle/>
-                    <a:p>
-                      <a:r>
-                        <a:rPr lang="en-US" dirty="0" err="1"/>
-                        <a:t>Thalach</a:t>
-                      </a:r>
-                      <a:endParaRPr lang="en-US" dirty="0"/>
-                    </a:p>
-                  </a:txBody>
-                  <a:tcPr/>
-                </a:tc>
-                <a:tc>
-                  <a:txBody>
-                    <a:bodyPr/>
-                    <a:lstStyle/>
-                    <a:p>
-                      <a:r>
-                        <a:rPr lang="en-US" dirty="0"/>
-                        <a:t>3</a:t>
-                      </a:r>
-                    </a:p>
-                  </a:txBody>
-                  <a:tcPr/>
-                </a:tc>
-                <a:tc>
-                  <a:txBody>
-                    <a:bodyPr/>
-                    <a:lstStyle/>
-                    <a:p>
-                      <a:endParaRPr lang="en-US"/>
-                    </a:p>
-                  </a:txBody>
-                  <a:tcPr/>
-                </a:tc>
-                <a:tc>
-                  <a:txBody>
-                    <a:bodyPr/>
-                    <a:lstStyle/>
-                    <a:p>
-                      <a:endParaRPr lang="en-US" dirty="0"/>
-                    </a:p>
-                  </a:txBody>
-                  <a:tcPr/>
-                </a:tc>
-                <a:tc>
-                  <a:txBody>
-                    <a:bodyPr/>
-                    <a:lstStyle/>
-                    <a:p>
-                      <a:endParaRPr lang="en-US" dirty="0"/>
-                    </a:p>
-                  </a:txBody>
-                  <a:tcPr/>
-                </a:tc>
-                <a:tc>
-                  <a:txBody>
-                    <a:bodyPr/>
-                    <a:lstStyle/>
-                    <a:p>
-                      <a:r>
-                        <a:rPr lang="en-US" dirty="0"/>
-                        <a:t>Max Heart Rate Achieved</a:t>
-                      </a:r>
-                    </a:p>
-                  </a:txBody>
-                  <a:tcPr/>
-                </a:tc>
-                <a:extLst>
-                  <a:ext uri="{0D108BD9-81ED-4DB2-BD59-A6C34878D82A}">
-                    <a16:rowId xmlns:a16="http://schemas.microsoft.com/office/drawing/2014/main" val="2210812529"/>
-                  </a:ext>
-                </a:extLst>
-              </a:tr>
-              <a:tr h="586355">
-                <a:tc>
-                  <a:txBody>
-                    <a:bodyPr/>
-                    <a:lstStyle/>
-                    <a:p>
-                      <a:r>
-                        <a:rPr lang="en-US" dirty="0" err="1"/>
-                        <a:t>Oldpeak</a:t>
-                      </a:r>
-                      <a:endParaRPr lang="en-US" dirty="0"/>
-                    </a:p>
-                  </a:txBody>
-                  <a:tcPr/>
-                </a:tc>
-                <a:tc>
-                  <a:txBody>
-                    <a:bodyPr/>
-                    <a:lstStyle/>
-                    <a:p>
-                      <a:r>
-                        <a:rPr lang="en-US" dirty="0"/>
-                        <a:t>2</a:t>
-                      </a:r>
-                    </a:p>
-                  </a:txBody>
-                  <a:tcPr/>
-                </a:tc>
-                <a:tc>
-                  <a:txBody>
-                    <a:bodyPr/>
-                    <a:lstStyle/>
-                    <a:p>
-                      <a:endParaRPr lang="en-US"/>
-                    </a:p>
-                  </a:txBody>
-                  <a:tcPr/>
-                </a:tc>
-                <a:tc>
-                  <a:txBody>
-                    <a:bodyPr/>
-                    <a:lstStyle/>
-                    <a:p>
-                      <a:endParaRPr lang="en-US"/>
-                    </a:p>
-                  </a:txBody>
-                  <a:tcPr/>
-                </a:tc>
-                <a:tc>
-                  <a:txBody>
-                    <a:bodyPr/>
-                    <a:lstStyle/>
-                    <a:p>
-                      <a:endParaRPr lang="en-US"/>
-                    </a:p>
-                  </a:txBody>
-                  <a:tcPr/>
-                </a:tc>
-                <a:tc>
-                  <a:txBody>
-                    <a:bodyPr/>
-                    <a:lstStyle/>
-                    <a:p>
-                      <a:r>
-                        <a:rPr lang="en-US" dirty="0"/>
-                        <a:t>ST Depression Induced by Exercise Relative to Rest</a:t>
-                      </a:r>
-                    </a:p>
-                  </a:txBody>
-                  <a:tcPr/>
-                </a:tc>
-                <a:extLst>
-                  <a:ext uri="{0D108BD9-81ED-4DB2-BD59-A6C34878D82A}">
-                    <a16:rowId xmlns:a16="http://schemas.microsoft.com/office/drawing/2014/main" val="2603487443"/>
-                  </a:ext>
-                </a:extLst>
-              </a:tr>
-              <a:tr h="602049">
+                        <a:t>131.62</a:t>
+                      </a:r>
+                    </a:p>
+                  </a:txBody>
+                  <a:tcPr/>
+                </a:tc>
+                <a:tc>
+                  <a:txBody>
+                    <a:bodyPr/>
+                    <a:lstStyle/>
+                    <a:p>
+                      <a:r>
+                        <a:rPr lang="en-US" dirty="0"/>
+                        <a:t>17.54</a:t>
+                      </a:r>
+                    </a:p>
+                  </a:txBody>
+                  <a:tcPr/>
+                </a:tc>
+                <a:tc>
+                  <a:txBody>
+                    <a:bodyPr/>
+                    <a:lstStyle/>
+                    <a:p>
+                      <a:r>
+                        <a:rPr lang="en-US" dirty="0"/>
+                        <a:t>94-200</a:t>
+                      </a:r>
+                    </a:p>
+                  </a:txBody>
+                  <a:tcPr/>
+                </a:tc>
                 <a:tc>
                   <a:txBody>
                     <a:bodyPr/>
@@ -5150,63 +4901,20 @@
                       </a:pPr>
                       <a:r>
                         <a:rPr lang="en-US" dirty="0"/>
-                        <a:t>Slope</a:t>
-                      </a:r>
-                    </a:p>
-                  </a:txBody>
-                  <a:tcPr/>
-                </a:tc>
-                <a:tc>
-                  <a:txBody>
-                    <a:bodyPr/>
-                    <a:lstStyle/>
-                    <a:p>
-                      <a:r>
-                        <a:rPr lang="en-US" dirty="0"/>
-                        <a:t>3</a:t>
-                      </a:r>
-                    </a:p>
-                  </a:txBody>
-                  <a:tcPr/>
-                </a:tc>
-                <a:tc>
-                  <a:txBody>
-                    <a:bodyPr/>
-                    <a:lstStyle/>
-                    <a:p>
-                      <a:endParaRPr lang="en-US"/>
-                    </a:p>
-                  </a:txBody>
-                  <a:tcPr/>
-                </a:tc>
-                <a:tc>
-                  <a:txBody>
-                    <a:bodyPr/>
-                    <a:lstStyle/>
-                    <a:p>
-                      <a:endParaRPr lang="en-US"/>
-                    </a:p>
-                  </a:txBody>
-                  <a:tcPr/>
-                </a:tc>
-                <a:tc>
-                  <a:txBody>
-                    <a:bodyPr/>
-                    <a:lstStyle/>
-                    <a:p>
-                      <a:endParaRPr lang="en-US"/>
-                    </a:p>
-                  </a:txBody>
-                  <a:tcPr/>
-                </a:tc>
-                <a:tc>
-                  <a:txBody>
-                    <a:bodyPr/>
-                    <a:lstStyle/>
-                    <a:p>
-                      <a:r>
-                        <a:rPr lang="en-US" dirty="0"/>
-                        <a:t>Slope of the Peak Exercise Relative to Rest</a:t>
+                        <a:t>Z-Score</a:t>
+                      </a:r>
+                    </a:p>
+                  </a:txBody>
+                  <a:tcPr/>
+                </a:tc>
+                <a:tc>
+                  <a:txBody>
+                    <a:bodyPr/>
+                    <a:lstStyle/>
+                    <a:p>
+                      <a:r>
+                        <a:rPr lang="en-US" dirty="0"/>
+                        <a:t>Resting Blood Pressure</a:t>
                       </a:r>
                     </a:p>
                   </a:txBody>
@@ -5214,11 +4922,268 @@
                 </a:tc>
                 <a:extLst>
                   <a:ext uri="{0D108BD9-81ED-4DB2-BD59-A6C34878D82A}">
-                    <a16:rowId xmlns:a16="http://schemas.microsoft.com/office/drawing/2014/main" val="2857208965"/>
+                    <a16:rowId xmlns:a16="http://schemas.microsoft.com/office/drawing/2014/main" val="1958690204"/>
+                  </a:ext>
+                </a:extLst>
+              </a:tr>
+              <a:tr h="602049">
+                <a:tc>
+                  <a:txBody>
+                    <a:bodyPr/>
+                    <a:lstStyle/>
+                    <a:p>
+                      <a:r>
+                        <a:rPr lang="en-US" dirty="0"/>
+                        <a:t>Chol</a:t>
+                      </a:r>
+                    </a:p>
+                  </a:txBody>
+                  <a:tcPr/>
+                </a:tc>
+                <a:tc>
+                  <a:txBody>
+                    <a:bodyPr/>
+                    <a:lstStyle/>
+                    <a:p>
+                      <a:r>
+                        <a:rPr lang="en-US" dirty="0"/>
+                        <a:t>246.26</a:t>
+                      </a:r>
+                    </a:p>
+                  </a:txBody>
+                  <a:tcPr/>
+                </a:tc>
+                <a:tc>
+                  <a:txBody>
+                    <a:bodyPr/>
+                    <a:lstStyle/>
+                    <a:p>
+                      <a:r>
+                        <a:rPr lang="en-US" dirty="0"/>
+                        <a:t>51.83</a:t>
+                      </a:r>
+                    </a:p>
+                  </a:txBody>
+                  <a:tcPr/>
+                </a:tc>
+                <a:tc>
+                  <a:txBody>
+                    <a:bodyPr/>
+                    <a:lstStyle/>
+                    <a:p>
+                      <a:r>
+                        <a:rPr lang="en-US" dirty="0"/>
+                        <a:t>126-564</a:t>
+                      </a:r>
+                    </a:p>
+                  </a:txBody>
+                  <a:tcPr/>
+                </a:tc>
+                <a:tc>
+                  <a:txBody>
+                    <a:bodyPr/>
+                    <a:lstStyle/>
+                    <a:p>
+                      <a:r>
+                        <a:rPr lang="en-US" dirty="0"/>
+                        <a:t>Z-Score</a:t>
+                      </a:r>
+                    </a:p>
+                  </a:txBody>
+                  <a:tcPr/>
+                </a:tc>
+                <a:tc>
+                  <a:txBody>
+                    <a:bodyPr/>
+                    <a:lstStyle/>
+                    <a:p>
+                      <a:r>
+                        <a:rPr lang="en-US" dirty="0"/>
+                        <a:t>Cholesterols</a:t>
+                      </a:r>
+                    </a:p>
+                  </a:txBody>
+                  <a:tcPr/>
+                </a:tc>
+                <a:extLst>
+                  <a:ext uri="{0D108BD9-81ED-4DB2-BD59-A6C34878D82A}">
+                    <a16:rowId xmlns:a16="http://schemas.microsoft.com/office/drawing/2014/main" val="3620477404"/>
                   </a:ext>
                 </a:extLst>
               </a:tr>
               <a:tr h="586355">
+                <a:tc>
+                  <a:txBody>
+                    <a:bodyPr/>
+                    <a:lstStyle/>
+                    <a:p>
+                      <a:r>
+                        <a:rPr lang="en-US" dirty="0" err="1"/>
+                        <a:t>Thalach</a:t>
+                      </a:r>
+                      <a:endParaRPr lang="en-US" dirty="0"/>
+                    </a:p>
+                  </a:txBody>
+                  <a:tcPr/>
+                </a:tc>
+                <a:tc>
+                  <a:txBody>
+                    <a:bodyPr/>
+                    <a:lstStyle/>
+                    <a:p>
+                      <a:r>
+                        <a:rPr lang="en-US" dirty="0"/>
+                        <a:t>149.65</a:t>
+                      </a:r>
+                    </a:p>
+                  </a:txBody>
+                  <a:tcPr/>
+                </a:tc>
+                <a:tc>
+                  <a:txBody>
+                    <a:bodyPr/>
+                    <a:lstStyle/>
+                    <a:p>
+                      <a:r>
+                        <a:rPr lang="en-US" dirty="0"/>
+                        <a:t>22.91</a:t>
+                      </a:r>
+                    </a:p>
+                  </a:txBody>
+                  <a:tcPr/>
+                </a:tc>
+                <a:tc>
+                  <a:txBody>
+                    <a:bodyPr/>
+                    <a:lstStyle/>
+                    <a:p>
+                      <a:r>
+                        <a:rPr lang="en-US" dirty="0"/>
+                        <a:t>71-202</a:t>
+                      </a:r>
+                    </a:p>
+                  </a:txBody>
+                  <a:tcPr/>
+                </a:tc>
+                <a:tc>
+                  <a:txBody>
+                    <a:bodyPr/>
+                    <a:lstStyle/>
+                    <a:p>
+                      <a:r>
+                        <a:rPr lang="en-US" dirty="0"/>
+                        <a:t>Z-Score</a:t>
+                      </a:r>
+                    </a:p>
+                  </a:txBody>
+                  <a:tcPr/>
+                </a:tc>
+                <a:tc>
+                  <a:txBody>
+                    <a:bodyPr/>
+                    <a:lstStyle/>
+                    <a:p>
+                      <a:r>
+                        <a:rPr lang="en-US" dirty="0"/>
+                        <a:t>Max Heart Rate Achieved</a:t>
+                      </a:r>
+                    </a:p>
+                  </a:txBody>
+                  <a:tcPr/>
+                </a:tc>
+                <a:extLst>
+                  <a:ext uri="{0D108BD9-81ED-4DB2-BD59-A6C34878D82A}">
+                    <a16:rowId xmlns:a16="http://schemas.microsoft.com/office/drawing/2014/main" val="2210812529"/>
+                  </a:ext>
+                </a:extLst>
+              </a:tr>
+              <a:tr h="586355">
+                <a:tc>
+                  <a:txBody>
+                    <a:bodyPr/>
+                    <a:lstStyle/>
+                    <a:p>
+                      <a:r>
+                        <a:rPr lang="en-US" dirty="0" err="1"/>
+                        <a:t>Oldpeak</a:t>
+                      </a:r>
+                      <a:endParaRPr lang="en-US" dirty="0"/>
+                    </a:p>
+                  </a:txBody>
+                  <a:tcPr/>
+                </a:tc>
+                <a:tc>
+                  <a:txBody>
+                    <a:bodyPr/>
+                    <a:lstStyle/>
+                    <a:p>
+                      <a:r>
+                        <a:rPr lang="en-US" dirty="0"/>
+                        <a:t>1.04</a:t>
+                      </a:r>
+                    </a:p>
+                  </a:txBody>
+                  <a:tcPr/>
+                </a:tc>
+                <a:tc>
+                  <a:txBody>
+                    <a:bodyPr/>
+                    <a:lstStyle/>
+                    <a:p>
+                      <a:r>
+                        <a:rPr lang="en-US" dirty="0"/>
+                        <a:t>1.16</a:t>
+                      </a:r>
+                    </a:p>
+                  </a:txBody>
+                  <a:tcPr/>
+                </a:tc>
+                <a:tc>
+                  <a:txBody>
+                    <a:bodyPr/>
+                    <a:lstStyle/>
+                    <a:p>
+                      <a:r>
+                        <a:rPr lang="en-US" dirty="0"/>
+                        <a:t>0-6.2</a:t>
+                      </a:r>
+                    </a:p>
+                  </a:txBody>
+                  <a:tcPr/>
+                </a:tc>
+                <a:tc>
+                  <a:txBody>
+                    <a:bodyPr/>
+                    <a:lstStyle/>
+                    <a:p>
+                      <a:r>
+                        <a:rPr lang="en-US" dirty="0"/>
+                        <a:t>Z-Score</a:t>
+                      </a:r>
+                    </a:p>
+                  </a:txBody>
+                  <a:tcPr/>
+                </a:tc>
+                <a:tc>
+                  <a:txBody>
+                    <a:bodyPr/>
+                    <a:lstStyle/>
+                    <a:p>
+                      <a:r>
+                        <a:rPr lang="en-US" dirty="0"/>
+                        <a:t>ST Depression Induced by Exercise Relative to Rest</a:t>
+                      </a:r>
+                    </a:p>
+                  </a:txBody>
+                  <a:tcPr/>
+                </a:tc>
+                <a:extLst>
+                  <a:ext uri="{0D108BD9-81ED-4DB2-BD59-A6C34878D82A}">
+                    <a16:rowId xmlns:a16="http://schemas.microsoft.com/office/drawing/2014/main" val="2603487443"/>
+                  </a:ext>
+                </a:extLst>
+              </a:tr>
+              <a:tr h="602049">
                 <a:tc>
                   <a:txBody>
                     <a:bodyPr/>
@@ -5243,6 +5208,108 @@
                       </a:pPr>
                       <a:r>
                         <a:rPr lang="en-US" dirty="0"/>
+                        <a:t>Slope</a:t>
+                      </a:r>
+                    </a:p>
+                  </a:txBody>
+                  <a:tcPr/>
+                </a:tc>
+                <a:tc>
+                  <a:txBody>
+                    <a:bodyPr/>
+                    <a:lstStyle/>
+                    <a:p>
+                      <a:r>
+                        <a:rPr lang="en-US" dirty="0"/>
+                        <a:t>1.40</a:t>
+                      </a:r>
+                    </a:p>
+                  </a:txBody>
+                  <a:tcPr/>
+                </a:tc>
+                <a:tc>
+                  <a:txBody>
+                    <a:bodyPr/>
+                    <a:lstStyle/>
+                    <a:p>
+                      <a:r>
+                        <a:rPr lang="en-US" dirty="0"/>
+                        <a:t>0.62</a:t>
+                      </a:r>
+                    </a:p>
+                  </a:txBody>
+                  <a:tcPr/>
+                </a:tc>
+                <a:tc>
+                  <a:txBody>
+                    <a:bodyPr/>
+                    <a:lstStyle/>
+                    <a:p>
+                      <a:r>
+                        <a:rPr lang="en-US" dirty="0"/>
+                        <a:t>0-2</a:t>
+                      </a:r>
+                    </a:p>
+                  </a:txBody>
+                  <a:tcPr/>
+                </a:tc>
+                <a:tc>
+                  <a:txBody>
+                    <a:bodyPr/>
+                    <a:lstStyle/>
+                    <a:p>
+                      <a:r>
+                        <a:rPr lang="en-US" dirty="0"/>
+                        <a:t>Z-Score</a:t>
+                      </a:r>
+                    </a:p>
+                  </a:txBody>
+                  <a:tcPr/>
+                </a:tc>
+                <a:tc>
+                  <a:txBody>
+                    <a:bodyPr/>
+                    <a:lstStyle/>
+                    <a:p>
+                      <a:r>
+                        <a:rPr lang="en-US" dirty="0"/>
+                        <a:t>Slope of the Peak Exercise Relative to Rest</a:t>
+                      </a:r>
+                    </a:p>
+                  </a:txBody>
+                  <a:tcPr/>
+                </a:tc>
+                <a:extLst>
+                  <a:ext uri="{0D108BD9-81ED-4DB2-BD59-A6C34878D82A}">
+                    <a16:rowId xmlns:a16="http://schemas.microsoft.com/office/drawing/2014/main" val="2857208965"/>
+                  </a:ext>
+                </a:extLst>
+              </a:tr>
+              <a:tr h="586355">
+                <a:tc>
+                  <a:txBody>
+                    <a:bodyPr/>
+                    <a:lstStyle/>
+                    <a:p>
+                      <a:pPr marL="0" marR="0" lvl="0" indent="0" algn="l" defTabSz="914400" rtl="0" eaLnBrk="1" fontAlgn="auto" latinLnBrk="0" hangingPunct="1">
+                        <a:lnSpc>
+                          <a:spcPct val="100000"/>
+                        </a:lnSpc>
+                        <a:spcBef>
+                          <a:spcPts val="0"/>
+                        </a:spcBef>
+                        <a:spcAft>
+                          <a:spcPts val="0"/>
+                        </a:spcAft>
+                        <a:buClrTx/>
+                        <a:buSzTx/>
+                        <a:buFontTx/>
+                        <a:buNone/>
+                        <a:tabLst/>
+                        <a:defRPr/>
+                      </a:pPr>
+                      <a:r>
+                        <a:rPr lang="en-US" dirty="0"/>
                         <a:t>Ca</a:t>
                       </a:r>
                     </a:p>
@@ -5256,27 +5323,21 @@
                     <a:p>
                       <a:r>
                         <a:rPr lang="en-US" dirty="0"/>
-                        <a:t>2</a:t>
-                      </a:r>
-                    </a:p>
-                  </a:txBody>
-                  <a:tcPr/>
-                </a:tc>
-                <a:tc>
-                  <a:txBody>
-                    <a:bodyPr/>
-                    <a:lstStyle/>
-                    <a:p>
-                      <a:endParaRPr lang="en-US"/>
-                    </a:p>
-                  </a:txBody>
-                  <a:tcPr/>
-                </a:tc>
-                <a:tc>
-                  <a:txBody>
-                    <a:bodyPr/>
-                    <a:lstStyle/>
-                    <a:p>
+                        <a:t>0.73</a:t>
+                      </a:r>
+                    </a:p>
+                  </a:txBody>
+                  <a:tcPr/>
+                </a:tc>
+                <a:tc>
+                  <a:txBody>
+                    <a:bodyPr/>
+                    <a:lstStyle/>
+                    <a:p>
+                      <a:r>
+                        <a:rPr lang="en-US"/>
+                        <a:t>1.02</a:t>
+                      </a:r>
                       <a:endParaRPr lang="en-US" dirty="0"/>
                     </a:p>
                   </a:txBody>
@@ -5287,7 +5348,23 @@
                     <a:bodyPr/>
                     <a:lstStyle/>
                     <a:p>
-                      <a:endParaRPr lang="en-US" dirty="0"/>
+                      <a:r>
+                        <a:rPr lang="en-US" dirty="0"/>
+                        <a:t>0-4</a:t>
+                      </a:r>
+                    </a:p>
+                  </a:txBody>
+                  <a:tcPr/>
+                </a:tc>
+                <a:tc>
+                  <a:txBody>
+                    <a:bodyPr/>
+                    <a:lstStyle/>
+                    <a:p>
+                      <a:r>
+                        <a:rPr lang="en-US" dirty="0"/>
+                        <a:t>Z-Score</a:t>
+                      </a:r>
                     </a:p>
                   </a:txBody>
                   <a:tcPr/>

</xml_diff>